<commit_message>
Presentation 1.pptx updated by ccox on 4/5/09
</commit_message>
<xml_diff>
--- a/Documents/Presentation 1.pptx
+++ b/Documents/Presentation 1.pptx
@@ -6,9 +6,14 @@
   </p:sldMasterIdLst>
   <p:sldIdLst>
     <p:sldId id="256" r:id="rId2"/>
-    <p:sldId id="258" r:id="rId3"/>
-    <p:sldId id="257" r:id="rId4"/>
-    <p:sldId id="259" r:id="rId5"/>
+    <p:sldId id="260" r:id="rId3"/>
+    <p:sldId id="261" r:id="rId4"/>
+    <p:sldId id="258" r:id="rId5"/>
+    <p:sldId id="262" r:id="rId6"/>
+    <p:sldId id="263" r:id="rId7"/>
+    <p:sldId id="264" r:id="rId8"/>
+    <p:sldId id="257" r:id="rId9"/>
+    <p:sldId id="259" r:id="rId10"/>
   </p:sldIdLst>
   <p:sldSz cx="9144000" cy="6858000" type="screen4x3"/>
   <p:notesSz cx="6858000" cy="9144000"/>
@@ -2953,7 +2958,7 @@
             <a:fld id="{78448947-47E2-4C40-9F60-79101A924B0F}" type="datetimeFigureOut">
               <a:rPr lang="en-US"/>
               <a:pPr/>
-              <a:t>3/2/2009</a:t>
+              <a:t>4/5/2009</a:t>
             </a:fld>
             <a:endParaRPr lang="en-US"/>
           </a:p>
@@ -3147,7 +3152,7 @@
             <a:fld id="{7650EAB9-E4A7-4066-9D9F-E177106E0B0E}" type="datetimeFigureOut">
               <a:rPr lang="en-US"/>
               <a:pPr/>
-              <a:t>3/2/2009</a:t>
+              <a:t>4/5/2009</a:t>
             </a:fld>
             <a:endParaRPr lang="en-US"/>
           </a:p>
@@ -3334,7 +3339,7 @@
             <a:fld id="{3919FDD3-A80B-4928-9D2A-ACF33E4E6123}" type="datetimeFigureOut">
               <a:rPr lang="en-US"/>
               <a:pPr/>
-              <a:t>3/2/2009</a:t>
+              <a:t>4/5/2009</a:t>
             </a:fld>
             <a:endParaRPr lang="en-US"/>
           </a:p>
@@ -3511,7 +3516,7 @@
             <a:fld id="{90103A15-3D4E-478E-8694-F3EB8034D859}" type="datetimeFigureOut">
               <a:rPr lang="en-US"/>
               <a:pPr/>
-              <a:t>3/2/2009</a:t>
+              <a:t>4/5/2009</a:t>
             </a:fld>
             <a:endParaRPr lang="en-US"/>
           </a:p>
@@ -3711,7 +3716,7 @@
             <a:fld id="{E64C6597-5A16-410C-ABDC-091A8BC1DD77}" type="datetimeFigureOut">
               <a:rPr lang="en-US"/>
               <a:pPr/>
-              <a:t>3/2/2009</a:t>
+              <a:t>4/5/2009</a:t>
             </a:fld>
             <a:endParaRPr lang="en-US"/>
           </a:p>
@@ -4005,7 +4010,7 @@
             <a:fld id="{ECA269A9-BB9D-4581-853E-AA9F2A570D1A}" type="datetimeFigureOut">
               <a:rPr lang="en-US"/>
               <a:pPr/>
-              <a:t>3/2/2009</a:t>
+              <a:t>4/5/2009</a:t>
             </a:fld>
             <a:endParaRPr lang="en-US"/>
           </a:p>
@@ -4433,7 +4438,7 @@
             <a:fld id="{D913B450-2544-4208-A216-3FF1F3192E9F}" type="datetimeFigureOut">
               <a:rPr lang="en-US"/>
               <a:pPr/>
-              <a:t>3/2/2009</a:t>
+              <a:t>4/5/2009</a:t>
             </a:fld>
             <a:endParaRPr lang="en-US"/>
           </a:p>
@@ -4559,7 +4564,7 @@
             <a:fld id="{A3B941C6-9A3D-45C1-AD07-83B72CF5B17B}" type="datetimeFigureOut">
               <a:rPr lang="en-US"/>
               <a:pPr/>
-              <a:t>3/2/2009</a:t>
+              <a:t>4/5/2009</a:t>
             </a:fld>
             <a:endParaRPr lang="en-US"/>
           </a:p>
@@ -4663,7 +4668,7 @@
             <a:fld id="{5A241512-B441-4E37-A9F4-254767B10338}" type="datetimeFigureOut">
               <a:rPr lang="en-US"/>
               <a:pPr/>
-              <a:t>3/2/2009</a:t>
+              <a:t>4/5/2009</a:t>
             </a:fld>
             <a:endParaRPr lang="en-US"/>
           </a:p>
@@ -4947,7 +4952,7 @@
             <a:fld id="{EF9D99A8-FD42-4832-9338-D5C21E2BBC08}" type="datetimeFigureOut">
               <a:rPr lang="en-US"/>
               <a:pPr/>
-              <a:t>3/2/2009</a:t>
+              <a:t>4/5/2009</a:t>
             </a:fld>
             <a:endParaRPr lang="en-US"/>
           </a:p>
@@ -5208,7 +5213,7 @@
             <a:fld id="{AADB6698-4B37-41E5-92AE-A9979C8A6783}" type="datetimeFigureOut">
               <a:rPr lang="en-US"/>
               <a:pPr/>
-              <a:t>3/2/2009</a:t>
+              <a:t>4/5/2009</a:t>
             </a:fld>
             <a:endParaRPr lang="en-US"/>
           </a:p>
@@ -5342,7 +5347,7 @@
             <a:fld id="{89F95CDD-1AC0-429E-A8EF-5051172C6F2F}" type="datetimeFigureOut">
               <a:rPr lang="en-US"/>
               <a:pPr/>
-              <a:t>3/2/2009</a:t>
+              <a:t>4/5/2009</a:t>
             </a:fld>
             <a:endParaRPr lang="en-US"/>
           </a:p>
@@ -8904,6 +8909,163 @@
       </p:grpSpPr>
       <p:sp>
         <p:nvSpPr>
+          <p:cNvPr id="2" name="Title 1"/>
+          <p:cNvSpPr>
+            <a:spLocks noGrp="1"/>
+          </p:cNvSpPr>
+          <p:nvPr>
+            <p:ph type="title"/>
+          </p:nvPr>
+        </p:nvSpPr>
+        <p:spPr/>
+        <p:txBody>
+          <a:bodyPr/>
+          <a:lstStyle/>
+          <a:p>
+            <a:r>
+              <a:rPr lang="en-US" dirty="0" smtClean="0"/>
+              <a:t>Problem Statement</a:t>
+            </a:r>
+            <a:endParaRPr lang="en-US" dirty="0"/>
+          </a:p>
+        </p:txBody>
+      </p:sp>
+      <p:sp>
+        <p:nvSpPr>
+          <p:cNvPr id="3" name="Content Placeholder 2"/>
+          <p:cNvSpPr>
+            <a:spLocks noGrp="1"/>
+          </p:cNvSpPr>
+          <p:nvPr>
+            <p:ph idx="1"/>
+          </p:nvPr>
+        </p:nvSpPr>
+        <p:spPr/>
+        <p:txBody>
+          <a:bodyPr/>
+          <a:lstStyle/>
+          <a:p>
+            <a:r>
+              <a:rPr lang="en-US" sz="2400" dirty="0" smtClean="0"/>
+              <a:t>The Southeastern Cal Ripken Baseball League based in Lexington, KY, needs to have a way to track their leagues via the World Wide Web.  The current system in place calls for manual entry of all leagues and teams into a hand-created spreadsheet.  Each year’s schedule is entered along with the outcome of each game.  The records of each team must then be manually updated to reflect the scores.  The standings of each league must then be manually updated to show which teams are currently ranked first, second, and so on.  Additionally, the Southeastern Cal Ripken Baseball League also has several other age groups of leagues that work in conjunction with them.  These leagues would also be interested in an online league tracking environment</a:t>
+            </a:r>
+            <a:r>
+              <a:rPr lang="en-US" sz="2400" dirty="0" smtClean="0"/>
+              <a:t>.</a:t>
+            </a:r>
+            <a:r>
+              <a:rPr lang="en-US" sz="1800" dirty="0" smtClean="0"/>
+              <a:t>	</a:t>
+            </a:r>
+            <a:endParaRPr lang="en-US" sz="1800" dirty="0" smtClean="0"/>
+          </a:p>
+          <a:p>
+            <a:endParaRPr lang="en-US" sz="1800" dirty="0" smtClean="0"/>
+          </a:p>
+        </p:txBody>
+      </p:sp>
+    </p:spTree>
+  </p:cSld>
+  <p:clrMapOvr>
+    <a:masterClrMapping/>
+  </p:clrMapOvr>
+</p:sld>
+</file>
+
+<file path=ppt/slides/slide3.xml><?xml version="1.0" encoding="utf-8"?>
+<p:sld xmlns:a="http://schemas.openxmlformats.org/drawingml/2006/main" xmlns:r="http://schemas.openxmlformats.org/officeDocument/2006/relationships" xmlns:p="http://schemas.openxmlformats.org/presentationml/2006/main">
+  <p:cSld>
+    <p:spTree>
+      <p:nvGrpSpPr>
+        <p:cNvPr id="1" name=""/>
+        <p:cNvGrpSpPr/>
+        <p:nvPr/>
+      </p:nvGrpSpPr>
+      <p:grpSpPr>
+        <a:xfrm>
+          <a:off x="0" y="0"/>
+          <a:ext cx="0" cy="0"/>
+          <a:chOff x="0" y="0"/>
+          <a:chExt cx="0" cy="0"/>
+        </a:xfrm>
+      </p:grpSpPr>
+      <p:sp>
+        <p:nvSpPr>
+          <p:cNvPr id="2" name="Title 1"/>
+          <p:cNvSpPr>
+            <a:spLocks noGrp="1"/>
+          </p:cNvSpPr>
+          <p:nvPr>
+            <p:ph type="title"/>
+          </p:nvPr>
+        </p:nvSpPr>
+        <p:spPr/>
+        <p:txBody>
+          <a:bodyPr/>
+          <a:lstStyle/>
+          <a:p>
+            <a:r>
+              <a:rPr lang="en-US" dirty="0" smtClean="0"/>
+              <a:t>Problem Statement, cont.</a:t>
+            </a:r>
+            <a:endParaRPr lang="en-US" dirty="0"/>
+          </a:p>
+        </p:txBody>
+      </p:sp>
+      <p:sp>
+        <p:nvSpPr>
+          <p:cNvPr id="3" name="Content Placeholder 2"/>
+          <p:cNvSpPr>
+            <a:spLocks noGrp="1"/>
+          </p:cNvSpPr>
+          <p:nvPr>
+            <p:ph idx="1"/>
+          </p:nvPr>
+        </p:nvSpPr>
+        <p:spPr/>
+        <p:txBody>
+          <a:bodyPr/>
+          <a:lstStyle/>
+          <a:p>
+            <a:r>
+              <a:rPr lang="en-US" sz="2400" dirty="0" smtClean="0"/>
+              <a:t>The Executive Board for the Southeastern Cal Ripken Baseball League would need to be able to add multiple leagues into an online tracking system of some sort.  These leagues would need to be able to track multiple teams.  Schedules, scores, and standings of these teams would also need to be able to be updated and viewed.  The Executive Board would also like the coaches, parents, players, and even the general public to have the ability to view the schedules, scores, and standings for all of the teams in the Southeastern Cal Ripken Baseball league.  Additionally, the Executive Board would need to be able to easily add other leagues and teams into the system</a:t>
+            </a:r>
+            <a:r>
+              <a:rPr lang="en-US" sz="2400" dirty="0" smtClean="0"/>
+              <a:t>.</a:t>
+            </a:r>
+            <a:endParaRPr lang="en-US" sz="2400" dirty="0" smtClean="0"/>
+          </a:p>
+        </p:txBody>
+      </p:sp>
+    </p:spTree>
+  </p:cSld>
+  <p:clrMapOvr>
+    <a:masterClrMapping/>
+  </p:clrMapOvr>
+</p:sld>
+</file>
+
+<file path=ppt/slides/slide4.xml><?xml version="1.0" encoding="utf-8"?>
+<p:sld xmlns:a="http://schemas.openxmlformats.org/drawingml/2006/main" xmlns:r="http://schemas.openxmlformats.org/officeDocument/2006/relationships" xmlns:p="http://schemas.openxmlformats.org/presentationml/2006/main">
+  <p:cSld>
+    <p:spTree>
+      <p:nvGrpSpPr>
+        <p:cNvPr id="1" name=""/>
+        <p:cNvGrpSpPr/>
+        <p:nvPr/>
+      </p:nvGrpSpPr>
+      <p:grpSpPr>
+        <a:xfrm>
+          <a:off x="0" y="0"/>
+          <a:ext cx="0" cy="0"/>
+          <a:chOff x="0" y="0"/>
+          <a:chExt cx="0" cy="0"/>
+        </a:xfrm>
+      </p:grpSpPr>
+      <p:sp>
+        <p:nvSpPr>
           <p:cNvPr id="14337" name="Title 1"/>
           <p:cNvSpPr>
             <a:spLocks noGrp="1"/>
@@ -8947,7 +9109,7 @@
               </a:lnSpc>
             </a:pPr>
             <a:r>
-              <a:rPr lang="en-US" sz="3000"/>
+              <a:rPr lang="en-US" sz="3000" dirty="0"/>
               <a:t>Web-based</a:t>
             </a:r>
           </a:p>
@@ -8958,9 +9120,22 @@
               </a:lnSpc>
             </a:pPr>
             <a:r>
-              <a:rPr lang="en-US" sz="3000"/>
-              <a:t>Track NBA schedules, real-time scores and standings</a:t>
+              <a:rPr lang="en-US" sz="3000" dirty="0"/>
+              <a:t>Track </a:t>
             </a:r>
+            <a:r>
+              <a:rPr lang="en-US" sz="3000" dirty="0" smtClean="0"/>
+              <a:t>schedules</a:t>
+            </a:r>
+            <a:r>
+              <a:rPr lang="en-US" sz="3000" dirty="0"/>
+              <a:t>, real-time scores and </a:t>
+            </a:r>
+            <a:r>
+              <a:rPr lang="en-US" sz="3000" dirty="0" smtClean="0"/>
+              <a:t>standings for user-created sports, leagues, and teams</a:t>
+            </a:r>
+            <a:endParaRPr lang="en-US" sz="3000" dirty="0"/>
           </a:p>
           <a:p>
             <a:pPr>
@@ -8969,7 +9144,7 @@
               </a:lnSpc>
             </a:pPr>
             <a:r>
-              <a:rPr lang="en-US" sz="3000"/>
+              <a:rPr lang="en-US" sz="3000" dirty="0"/>
               <a:t>Ability for users to vote on outcome of games</a:t>
             </a:r>
           </a:p>
@@ -8980,7 +9155,7 @@
               </a:lnSpc>
             </a:pPr>
             <a:r>
-              <a:rPr lang="en-US" sz="3000"/>
+              <a:rPr lang="en-US" sz="3000" dirty="0"/>
               <a:t>Users can view and post comments on injuries, scores, or general info</a:t>
             </a:r>
           </a:p>
@@ -8991,19 +9166,183 @@
               </a:lnSpc>
             </a:pPr>
             <a:r>
-              <a:rPr lang="en-US" sz="3000"/>
-              <a:t>Smart Outcome Prediction System, which takes into account team’s win / loss record</a:t>
+              <a:rPr lang="en-US" sz="3000" dirty="0"/>
+              <a:t>Smart Outcome Prediction System, which takes into account team’s win / loss </a:t>
+            </a:r>
+            <a:r>
+              <a:rPr lang="en-US" sz="3000" dirty="0" smtClean="0"/>
+              <a:t>record</a:t>
+            </a:r>
+            <a:endParaRPr lang="en-US" sz="3000" dirty="0"/>
+          </a:p>
+        </p:txBody>
+      </p:sp>
+    </p:spTree>
+  </p:cSld>
+  <p:clrMapOvr>
+    <a:masterClrMapping/>
+  </p:clrMapOvr>
+  <p:timing>
+    <p:tnLst>
+      <p:par>
+        <p:cTn id="1" dur="indefinite" restart="never" nodeType="tmRoot"/>
+      </p:par>
+    </p:tnLst>
+  </p:timing>
+</p:sld>
+</file>
+
+<file path=ppt/slides/slide5.xml><?xml version="1.0" encoding="utf-8"?>
+<p:sld xmlns:a="http://schemas.openxmlformats.org/drawingml/2006/main" xmlns:r="http://schemas.openxmlformats.org/officeDocument/2006/relationships" xmlns:p="http://schemas.openxmlformats.org/presentationml/2006/main">
+  <p:cSld>
+    <p:spTree>
+      <p:nvGrpSpPr>
+        <p:cNvPr id="1" name=""/>
+        <p:cNvGrpSpPr/>
+        <p:nvPr/>
+      </p:nvGrpSpPr>
+      <p:grpSpPr>
+        <a:xfrm>
+          <a:off x="0" y="0"/>
+          <a:ext cx="0" cy="0"/>
+          <a:chOff x="0" y="0"/>
+          <a:chExt cx="0" cy="0"/>
+        </a:xfrm>
+      </p:grpSpPr>
+      <p:sp>
+        <p:nvSpPr>
+          <p:cNvPr id="2" name="Title 1"/>
+          <p:cNvSpPr>
+            <a:spLocks noGrp="1"/>
+          </p:cNvSpPr>
+          <p:nvPr>
+            <p:ph type="title"/>
+          </p:nvPr>
+        </p:nvSpPr>
+        <p:spPr/>
+        <p:txBody>
+          <a:bodyPr/>
+          <a:lstStyle/>
+          <a:p>
+            <a:r>
+              <a:rPr lang="en-US" sz="3600" dirty="0" smtClean="0"/>
+              <a:t>System Requirements</a:t>
+            </a:r>
+            <a:r>
+              <a:rPr lang="en-US" dirty="0" smtClean="0"/>
+              <a:t/>
+            </a:r>
+            <a:br>
+              <a:rPr lang="en-US" dirty="0" smtClean="0"/>
+            </a:br>
+            <a:r>
+              <a:rPr lang="en-US" sz="2400" dirty="0" smtClean="0"/>
+              <a:t>Functional Requirements</a:t>
+            </a:r>
+            <a:endParaRPr lang="en-US" sz="2400" dirty="0"/>
+          </a:p>
+        </p:txBody>
+      </p:sp>
+      <p:sp>
+        <p:nvSpPr>
+          <p:cNvPr id="3" name="Content Placeholder 2"/>
+          <p:cNvSpPr>
+            <a:spLocks noGrp="1"/>
+          </p:cNvSpPr>
+          <p:nvPr>
+            <p:ph idx="1"/>
+          </p:nvPr>
+        </p:nvSpPr>
+        <p:spPr/>
+        <p:txBody>
+          <a:bodyPr/>
+          <a:lstStyle/>
+          <a:p>
+            <a:r>
+              <a:rPr lang="en-US" sz="2000" dirty="0" smtClean="0"/>
+              <a:t>R1.  Register New Account</a:t>
             </a:r>
           </a:p>
           <a:p>
-            <a:pPr>
-              <a:lnSpc>
-                <a:spcPct val="80000"/>
-              </a:lnSpc>
-            </a:pPr>
+            <a:pPr lvl="1"/>
             <a:r>
-              <a:rPr lang="en-US" sz="3000"/>
-              <a:t>Users can create their own sports, leagues, and teams to be tracked w/in the system</a:t>
+              <a:rPr lang="en-US" sz="2000" dirty="0" smtClean="0"/>
+              <a:t>Guest gives email, password, and first name</a:t>
+            </a:r>
+          </a:p>
+          <a:p>
+            <a:pPr lvl="1"/>
+            <a:r>
+              <a:rPr lang="en-US" sz="2000" dirty="0" smtClean="0"/>
+              <a:t>Systems ensures validity of email</a:t>
+            </a:r>
+          </a:p>
+          <a:p>
+            <a:pPr lvl="1"/>
+            <a:r>
+              <a:rPr lang="en-US" sz="2000" dirty="0" smtClean="0"/>
+              <a:t>User sent confirmation of registration</a:t>
+            </a:r>
+          </a:p>
+          <a:p>
+            <a:r>
+              <a:rPr lang="en-US" sz="2000" dirty="0" smtClean="0"/>
+              <a:t>R2.  Login / logout</a:t>
+            </a:r>
+          </a:p>
+          <a:p>
+            <a:pPr lvl="1"/>
+            <a:r>
+              <a:rPr lang="en-US" sz="2000" dirty="0" smtClean="0"/>
+              <a:t>User can login via valid login ID and password</a:t>
+            </a:r>
+          </a:p>
+          <a:p>
+            <a:pPr lvl="1"/>
+            <a:r>
+              <a:rPr lang="en-US" sz="2000" dirty="0" smtClean="0"/>
+              <a:t>Login confirmation shown</a:t>
+            </a:r>
+          </a:p>
+          <a:p>
+            <a:pPr lvl="1"/>
+            <a:r>
+              <a:rPr lang="en-US" sz="2000" dirty="0" smtClean="0"/>
+              <a:t>User can logout after successful login</a:t>
+            </a:r>
+          </a:p>
+          <a:p>
+            <a:r>
+              <a:rPr lang="en-US" sz="2000" dirty="0" smtClean="0"/>
+              <a:t>R3.  Modify / Reset Password</a:t>
+            </a:r>
+          </a:p>
+          <a:p>
+            <a:pPr lvl="1"/>
+            <a:r>
+              <a:rPr lang="en-US" sz="2000" dirty="0" smtClean="0"/>
+              <a:t>After successful login, user can change password by giving old password and new password</a:t>
+            </a:r>
+          </a:p>
+          <a:p>
+            <a:pPr lvl="1"/>
+            <a:r>
+              <a:rPr lang="en-US" sz="2000" dirty="0" smtClean="0"/>
+              <a:t>Change password confirmation shown</a:t>
+            </a:r>
+          </a:p>
+          <a:p>
+            <a:pPr lvl="1"/>
+            <a:r>
+              <a:rPr lang="en-US" sz="2000" dirty="0" smtClean="0"/>
+              <a:t>User can also reset password using their login ID and email address</a:t>
+            </a:r>
+          </a:p>
+          <a:p>
+            <a:pPr lvl="1"/>
+            <a:r>
+              <a:rPr lang="en-US" sz="2000" dirty="0" smtClean="0"/>
+              <a:t>Temporary password sent to email on file</a:t>
             </a:r>
           </a:p>
         </p:txBody>
@@ -9023,7 +9362,286 @@
 </p:sld>
 </file>
 
-<file path=ppt/slides/slide3.xml><?xml version="1.0" encoding="utf-8"?>
+<file path=ppt/slides/slide6.xml><?xml version="1.0" encoding="utf-8"?>
+<p:sld xmlns:a="http://schemas.openxmlformats.org/drawingml/2006/main" xmlns:r="http://schemas.openxmlformats.org/officeDocument/2006/relationships" xmlns:p="http://schemas.openxmlformats.org/presentationml/2006/main">
+  <p:cSld>
+    <p:spTree>
+      <p:nvGrpSpPr>
+        <p:cNvPr id="1" name=""/>
+        <p:cNvGrpSpPr/>
+        <p:nvPr/>
+      </p:nvGrpSpPr>
+      <p:grpSpPr>
+        <a:xfrm>
+          <a:off x="0" y="0"/>
+          <a:ext cx="0" cy="0"/>
+          <a:chOff x="0" y="0"/>
+          <a:chExt cx="0" cy="0"/>
+        </a:xfrm>
+      </p:grpSpPr>
+      <p:sp>
+        <p:nvSpPr>
+          <p:cNvPr id="2" name="Title 1"/>
+          <p:cNvSpPr>
+            <a:spLocks noGrp="1"/>
+          </p:cNvSpPr>
+          <p:nvPr>
+            <p:ph type="title"/>
+          </p:nvPr>
+        </p:nvSpPr>
+        <p:spPr/>
+        <p:txBody>
+          <a:bodyPr/>
+          <a:lstStyle/>
+          <a:p>
+            <a:r>
+              <a:rPr lang="en-US" sz="3600" dirty="0" smtClean="0"/>
+              <a:t>System Requirements</a:t>
+            </a:r>
+            <a:r>
+              <a:rPr lang="en-US" dirty="0" smtClean="0"/>
+              <a:t/>
+            </a:r>
+            <a:br>
+              <a:rPr lang="en-US" dirty="0" smtClean="0"/>
+            </a:br>
+            <a:r>
+              <a:rPr lang="en-US" sz="2400" dirty="0" smtClean="0"/>
+              <a:t>Functional </a:t>
+            </a:r>
+            <a:r>
+              <a:rPr lang="en-US" sz="2400" dirty="0" smtClean="0"/>
+              <a:t>Requirements, cont.</a:t>
+            </a:r>
+            <a:endParaRPr lang="en-US" sz="2400" dirty="0"/>
+          </a:p>
+        </p:txBody>
+      </p:sp>
+      <p:sp>
+        <p:nvSpPr>
+          <p:cNvPr id="3" name="Content Placeholder 2"/>
+          <p:cNvSpPr>
+            <a:spLocks noGrp="1"/>
+          </p:cNvSpPr>
+          <p:nvPr>
+            <p:ph idx="1"/>
+          </p:nvPr>
+        </p:nvSpPr>
+        <p:spPr/>
+        <p:txBody>
+          <a:bodyPr/>
+          <a:lstStyle/>
+          <a:p>
+            <a:r>
+              <a:rPr lang="en-US" sz="1600" dirty="0" smtClean="0"/>
+              <a:t>R4.  View Games Scores</a:t>
+            </a:r>
+          </a:p>
+          <a:p>
+            <a:pPr lvl="1"/>
+            <a:r>
+              <a:rPr lang="en-US" sz="1600" dirty="0" smtClean="0"/>
+              <a:t>Guests, registered users, and administrators can view game scores by league(s), sport(s) and/or teams</a:t>
+            </a:r>
+          </a:p>
+          <a:p>
+            <a:r>
+              <a:rPr lang="en-US" sz="1600" dirty="0" smtClean="0"/>
+              <a:t>R5.  View Game Schedules</a:t>
+            </a:r>
+          </a:p>
+          <a:p>
+            <a:pPr lvl="1"/>
+            <a:r>
+              <a:rPr lang="en-US" sz="1600" dirty="0" smtClean="0"/>
+              <a:t>Guests, registered users, and administrators can view game </a:t>
+            </a:r>
+            <a:r>
+              <a:rPr lang="en-US" sz="1600" dirty="0" smtClean="0"/>
+              <a:t>schedules </a:t>
+            </a:r>
+            <a:r>
+              <a:rPr lang="en-US" sz="1600" dirty="0" smtClean="0"/>
+              <a:t>by league(s), sport(s) and/or teams</a:t>
+            </a:r>
+          </a:p>
+          <a:p>
+            <a:r>
+              <a:rPr lang="en-US" sz="1600" dirty="0" smtClean="0"/>
+              <a:t>R6.  View comments</a:t>
+            </a:r>
+          </a:p>
+          <a:p>
+            <a:pPr lvl="1"/>
+            <a:r>
+              <a:rPr lang="en-US" sz="1600" dirty="0" smtClean="0"/>
+              <a:t>Guests, registered users, and administrators can view </a:t>
+            </a:r>
+            <a:r>
+              <a:rPr lang="en-US" sz="1600" dirty="0" smtClean="0"/>
+              <a:t>comments per game</a:t>
+            </a:r>
+          </a:p>
+          <a:p>
+            <a:r>
+              <a:rPr lang="en-US" sz="1600" dirty="0" smtClean="0"/>
+              <a:t>R7.  Post comments</a:t>
+            </a:r>
+          </a:p>
+          <a:p>
+            <a:pPr lvl="1"/>
+            <a:r>
+              <a:rPr lang="en-US" sz="1600" dirty="0" smtClean="0"/>
+              <a:t>After login, registered users and administrators can post comments</a:t>
+            </a:r>
+          </a:p>
+          <a:p>
+            <a:r>
+              <a:rPr lang="en-US" sz="1600" dirty="0" smtClean="0"/>
+              <a:t>R8.  User winner prediction</a:t>
+            </a:r>
+          </a:p>
+          <a:p>
+            <a:pPr lvl="1"/>
+            <a:r>
+              <a:rPr lang="en-US" sz="1600" dirty="0" smtClean="0"/>
+              <a:t>After login, registered users and administrators can vote for their predicted winner per game</a:t>
+            </a:r>
+          </a:p>
+          <a:p>
+            <a:r>
+              <a:rPr lang="en-US" sz="1600" dirty="0" smtClean="0"/>
+              <a:t>R9.  View system winner prediction and user winner prediction</a:t>
+            </a:r>
+          </a:p>
+          <a:p>
+            <a:pPr lvl="1"/>
+            <a:r>
+              <a:rPr lang="en-US" sz="1600" dirty="0" smtClean="0"/>
+              <a:t>Guests, registered users and administrators </a:t>
+            </a:r>
+            <a:r>
+              <a:rPr lang="en-US" sz="1600" dirty="0" smtClean="0"/>
+              <a:t>can view percentage chart of system winner prediction and percentage chart of user winner prediction</a:t>
+            </a:r>
+          </a:p>
+          <a:p>
+            <a:pPr lvl="1"/>
+            <a:r>
+              <a:rPr lang="en-US" sz="1600" dirty="0" smtClean="0"/>
+              <a:t>System prediction based on team’s win /loss percentages</a:t>
+            </a:r>
+          </a:p>
+          <a:p>
+            <a:pPr lvl="1"/>
+            <a:r>
+              <a:rPr lang="en-US" sz="1600" dirty="0" smtClean="0"/>
+              <a:t>User winner prediction based on sums of user votes per game</a:t>
+            </a:r>
+          </a:p>
+        </p:txBody>
+      </p:sp>
+    </p:spTree>
+  </p:cSld>
+  <p:clrMapOvr>
+    <a:masterClrMapping/>
+  </p:clrMapOvr>
+  <p:timing>
+    <p:tnLst>
+      <p:par>
+        <p:cTn id="1" dur="indefinite" restart="never" nodeType="tmRoot"/>
+      </p:par>
+    </p:tnLst>
+  </p:timing>
+</p:sld>
+</file>
+
+<file path=ppt/slides/slide7.xml><?xml version="1.0" encoding="utf-8"?>
+<p:sld xmlns:a="http://schemas.openxmlformats.org/drawingml/2006/main" xmlns:r="http://schemas.openxmlformats.org/officeDocument/2006/relationships" xmlns:p="http://schemas.openxmlformats.org/presentationml/2006/main">
+  <p:cSld>
+    <p:spTree>
+      <p:nvGrpSpPr>
+        <p:cNvPr id="1" name=""/>
+        <p:cNvGrpSpPr/>
+        <p:nvPr/>
+      </p:nvGrpSpPr>
+      <p:grpSpPr>
+        <a:xfrm>
+          <a:off x="0" y="0"/>
+          <a:ext cx="0" cy="0"/>
+          <a:chOff x="0" y="0"/>
+          <a:chExt cx="0" cy="0"/>
+        </a:xfrm>
+      </p:grpSpPr>
+      <p:sp>
+        <p:nvSpPr>
+          <p:cNvPr id="2" name="Title 1"/>
+          <p:cNvSpPr>
+            <a:spLocks noGrp="1"/>
+          </p:cNvSpPr>
+          <p:nvPr>
+            <p:ph type="title"/>
+          </p:nvPr>
+        </p:nvSpPr>
+        <p:spPr/>
+        <p:txBody>
+          <a:bodyPr/>
+          <a:lstStyle/>
+          <a:p>
+            <a:r>
+              <a:rPr lang="en-US" sz="3600" dirty="0" smtClean="0"/>
+              <a:t>System Requirements</a:t>
+            </a:r>
+            <a:br>
+              <a:rPr lang="en-US" sz="3600" dirty="0" smtClean="0"/>
+            </a:br>
+            <a:r>
+              <a:rPr lang="en-US" sz="2400" dirty="0" smtClean="0"/>
+              <a:t>Functional Requirements, cont.</a:t>
+            </a:r>
+            <a:endParaRPr lang="en-US" sz="2400" dirty="0"/>
+          </a:p>
+        </p:txBody>
+      </p:sp>
+      <p:sp>
+        <p:nvSpPr>
+          <p:cNvPr id="3" name="Content Placeholder 2"/>
+          <p:cNvSpPr>
+            <a:spLocks noGrp="1"/>
+          </p:cNvSpPr>
+          <p:nvPr>
+            <p:ph idx="1"/>
+          </p:nvPr>
+        </p:nvSpPr>
+        <p:spPr/>
+        <p:txBody>
+          <a:bodyPr/>
+          <a:lstStyle/>
+          <a:p>
+            <a:r>
+              <a:rPr lang="en-US" dirty="0" smtClean="0"/>
+              <a:t>R10.  Create </a:t>
+            </a:r>
+            <a:r>
+              <a:rPr lang="en-US" smtClean="0"/>
+              <a:t>custom sports</a:t>
+            </a:r>
+          </a:p>
+          <a:p>
+            <a:pPr lvl="1"/>
+            <a:endParaRPr lang="en-US" dirty="0"/>
+          </a:p>
+        </p:txBody>
+      </p:sp>
+    </p:spTree>
+  </p:cSld>
+  <p:clrMapOvr>
+    <a:masterClrMapping/>
+  </p:clrMapOvr>
+</p:sld>
+</file>
+
+<file path=ppt/slides/slide8.xml><?xml version="1.0" encoding="utf-8"?>
 <p:sld xmlns:a="http://schemas.openxmlformats.org/drawingml/2006/main" xmlns:r="http://schemas.openxmlformats.org/officeDocument/2006/relationships" xmlns:p="http://schemas.openxmlformats.org/presentationml/2006/main">
   <p:cSld>
     <p:spTree>
@@ -9322,7 +9940,7 @@
 </p:sld>
 </file>
 
-<file path=ppt/slides/slide4.xml><?xml version="1.0" encoding="utf-8"?>
+<file path=ppt/slides/slide9.xml><?xml version="1.0" encoding="utf-8"?>
 <p:sld xmlns:a="http://schemas.openxmlformats.org/drawingml/2006/main" xmlns:r="http://schemas.openxmlformats.org/officeDocument/2006/relationships" xmlns:p="http://schemas.openxmlformats.org/presentationml/2006/main">
   <p:cSld>
     <p:spTree>
@@ -9373,7 +9991,7 @@
         </p:nvGraphicFramePr>
         <p:xfrm>
           <a:off x="2438400" y="1600200"/>
-          <a:ext cx="4038600" cy="4495800"/>
+          <a:ext cx="4038600" cy="4495807"/>
         </p:xfrm>
         <a:graphic>
           <a:graphicData uri="http://schemas.openxmlformats.org/drawingml/2006/table">

</xml_diff>